<commit_message>
update lectures + practics
</commit_message>
<xml_diff>
--- a/Лекции/ИТиП 2 лек 3.pptx
+++ b/Лекции/ИТиП 2 лек 3.pptx
@@ -287,7 +287,7 @@
             <a:fld id="{AA2F9473-F066-431E-A6E8-1D478C995A6B}" type="datetimeFigureOut">
               <a:rPr lang="en-US" smtClean="0"/>
               <a:pPr/>
-              <a:t>3/9/2025</a:t>
+              <a:t>3/10/2025</a:t>
             </a:fld>
             <a:endParaRPr lang="en-US"/>
           </a:p>
@@ -34529,31 +34529,7 @@
                 <a:latin typeface="Bookman Old Style" panose="02050604050505020204" pitchFamily="18" charset="0"/>
                 <a:cs typeface="Times New Roman" panose="02020603050405020304" pitchFamily="18" charset="0"/>
               </a:rPr>
-              <a:t>Сравнение полиморфизма </a:t>
-            </a:r>
-            <a:r>
-              <a:rPr lang="ru-RU" sz="2800" b="1" dirty="0" smtClean="0">
-                <a:solidFill>
-                  <a:schemeClr val="tx2">
-                    <a:lumMod val="50000"/>
-                  </a:schemeClr>
-                </a:solidFill>
-                <a:latin typeface="Bookman Old Style" panose="02050604050505020204" pitchFamily="18" charset="0"/>
-                <a:cs typeface="Times New Roman" panose="02020603050405020304" pitchFamily="18" charset="0"/>
-              </a:rPr>
-              <a:t>подтипов и </a:t>
-            </a:r>
-            <a:r>
-              <a:rPr lang="ru-RU" sz="2800" b="1" dirty="0" smtClean="0">
-                <a:solidFill>
-                  <a:schemeClr val="tx2">
-                    <a:lumMod val="50000"/>
-                  </a:schemeClr>
-                </a:solidFill>
-                <a:latin typeface="Bookman Old Style" panose="02050604050505020204" pitchFamily="18" charset="0"/>
-                <a:cs typeface="Times New Roman" panose="02020603050405020304" pitchFamily="18" charset="0"/>
-              </a:rPr>
-              <a:t>сокрытия</a:t>
+              <a:t>Сравнение полиморфизма подтипов и сокрытия</a:t>
             </a:r>
             <a:endParaRPr lang="en-US" sz="2800" b="1" dirty="0">
               <a:solidFill>

</xml_diff>